<commit_message>
a score of probability slides
</commit_message>
<xml_diff>
--- a/spring13/slides13/expectation-intro.pptx
+++ b/spring13/slides13/expectation-intro.pptx
@@ -2685,11 +2685,7 @@
             </a:r>
             <a:r>
               <a:rPr lang="en-US" dirty="0" smtClean="0"/>
-              <a:t> </a:t>
-            </a:r>
-            <a:r>
-              <a:rPr lang="en-US" dirty="0" smtClean="0"/>
-              <a:t>12F.</a:t>
+              <a:t> 12F.</a:t>
             </a:r>
             <a:fld id="{FC9265C7-2444-489D-860F-86AAC4235083}" type="slidenum">
               <a:rPr lang="en-US" smtClean="0"/>
@@ -2864,11 +2860,7 @@
             </a:r>
             <a:r>
               <a:rPr lang="en-US" dirty="0" smtClean="0"/>
-              <a:t> </a:t>
-            </a:r>
-            <a:r>
-              <a:rPr lang="en-US" dirty="0" smtClean="0"/>
-              <a:t>12F.</a:t>
+              <a:t> 12F.</a:t>
             </a:r>
             <a:fld id="{7886A709-CED2-48A3-8616-B2655C008ECB}" type="slidenum">
               <a:rPr lang="en-US" smtClean="0"/>
@@ -2964,11 +2956,7 @@
             </a:r>
             <a:r>
               <a:rPr lang="en-US" dirty="0" smtClean="0"/>
-              <a:t> </a:t>
-            </a:r>
-            <a:r>
-              <a:rPr lang="en-US" dirty="0" smtClean="0"/>
-              <a:t>12F.</a:t>
+              <a:t> 12F.</a:t>
             </a:r>
             <a:fld id="{9B55653B-1858-43BF-A49A-533C730B553F}" type="slidenum">
               <a:rPr lang="en-US" smtClean="0"/>
@@ -3037,11 +3025,7 @@
             </a:r>
             <a:r>
               <a:rPr lang="en-US" dirty="0" smtClean="0"/>
-              <a:t> </a:t>
-            </a:r>
-            <a:r>
-              <a:rPr lang="en-US" dirty="0" smtClean="0"/>
-              <a:t>12F.</a:t>
+              <a:t> 12F.</a:t>
             </a:r>
             <a:fld id="{4E62291C-8AD8-4AE0-8F6D-A8437E91FB33}" type="slidenum">
               <a:rPr lang="en-US" smtClean="0"/>
@@ -3252,11 +3236,7 @@
             </a:r>
             <a:r>
               <a:rPr lang="en-US" dirty="0" smtClean="0"/>
-              <a:t> </a:t>
-            </a:r>
-            <a:r>
-              <a:rPr lang="en-US" dirty="0" smtClean="0"/>
-              <a:t>12F.</a:t>
+              <a:t> 12F.</a:t>
             </a:r>
             <a:fld id="{7886A709-CED2-48A3-8616-B2655C008ECB}" type="slidenum">
               <a:rPr lang="en-US" smtClean="0"/>
@@ -3352,37 +3332,7 @@
                 <a:uFillTx/>
                 <a:latin typeface="Comic Sans MS" pitchFamily="66" charset="0"/>
               </a:rPr>
-              <a:t>Albert R Meyer,            May </a:t>
-            </a:r>
-            <a:r>
-              <a:rPr kumimoji="0" lang="en-US" sz="1200" b="0" i="0" u="none" strike="noStrike" kern="1200" cap="none" spc="0" normalizeH="0" baseline="0" noProof="0" dirty="0" smtClean="0">
-                <a:ln>
-                  <a:noFill/>
-                </a:ln>
-                <a:solidFill>
-                  <a:schemeClr val="tx1"/>
-                </a:solidFill>
-                <a:effectLst/>
-                <a:uLnTx/>
-                <a:uFillTx/>
-                <a:latin typeface="Comic Sans MS" pitchFamily="66" charset="0"/>
-              </a:rPr>
-              <a:t>4, </a:t>
-            </a:r>
-            <a:r>
-              <a:rPr kumimoji="0" lang="en-US" sz="1200" b="0" i="0" u="none" strike="noStrike" kern="1200" cap="none" spc="0" normalizeH="0" baseline="0" noProof="0" dirty="0" smtClean="0">
-                <a:ln>
-                  <a:noFill/>
-                </a:ln>
-                <a:solidFill>
-                  <a:schemeClr val="tx1"/>
-                </a:solidFill>
-                <a:effectLst/>
-                <a:uLnTx/>
-                <a:uFillTx/>
-                <a:latin typeface="Comic Sans MS" pitchFamily="66" charset="0"/>
-              </a:rPr>
-              <a:t>2012</a:t>
+              <a:t>Albert R Meyer,            May 4, 2012</a:t>
             </a:r>
             <a:endParaRPr kumimoji="0" lang="en-US" sz="1200" b="0" i="0" u="none" strike="noStrike" kern="1200" cap="none" spc="0" normalizeH="0" baseline="0" noProof="0" dirty="0">
               <a:ln>
@@ -3986,11 +3936,7 @@
             </a:r>
             <a:r>
               <a:rPr lang="en-US" dirty="0" smtClean="0"/>
-              <a:t> </a:t>
-            </a:r>
-            <a:r>
-              <a:rPr lang="en-US" dirty="0" smtClean="0"/>
-              <a:t>12F.</a:t>
+              <a:t> 12F.</a:t>
             </a:r>
             <a:fld id="{93DA0692-DAF7-4AFE-9BE7-E02439D3694A}" type="slidenum">
               <a:rPr lang="en-US" smtClean="0"/>
@@ -4054,7 +4000,7 @@
           <a:graphicData uri="http://schemas.openxmlformats.org/presentationml/2006/ole">
             <mc:AlternateContent xmlns:mc="http://schemas.openxmlformats.org/markup-compatibility/2006">
               <mc:Choice xmlns:v="urn:schemas-microsoft-com:vml" Requires="v">
-                <p:oleObj spid="_x0000_s176160" name="Equation" r:id="rId4" imgW="2006280" imgH="812520" progId="Equation.DSMT4">
+                <p:oleObj spid="_x0000_s176162" name="Equation" r:id="rId4" imgW="2006280" imgH="812520" progId="Equation.DSMT4">
                   <p:embed/>
                 </p:oleObj>
               </mc:Choice>
@@ -4326,14 +4272,7 @@
                 <a:latin typeface="Comic Sans MS"/>
                 <a:cs typeface="Comic Sans MS"/>
               </a:rPr>
-              <a:t> </a:t>
-            </a:r>
-            <a:r>
-              <a:rPr lang="en-US" sz="1200" dirty="0" smtClean="0">
-                <a:latin typeface="Comic Sans MS"/>
-                <a:cs typeface="Comic Sans MS"/>
-              </a:rPr>
-              <a:t>12F.</a:t>
+              <a:t> 12F.</a:t>
             </a:r>
             <a:fld id="{93DA0692-DAF7-4AFE-9BE7-E02439D3694A}" type="slidenum">
               <a:rPr lang="en-US" sz="1200" smtClean="0">
@@ -4390,14 +4329,7 @@
                 <a:latin typeface="Comic Sans MS"/>
                 <a:cs typeface="Comic Sans MS"/>
               </a:rPr>
-              <a:t> </a:t>
-            </a:r>
-            <a:r>
-              <a:rPr lang="en-US" sz="1200" dirty="0" smtClean="0">
-                <a:latin typeface="Comic Sans MS"/>
-                <a:cs typeface="Comic Sans MS"/>
-              </a:rPr>
-              <a:t>12F.</a:t>
+              <a:t> 12F.</a:t>
             </a:r>
             <a:fld id="{93DA0692-DAF7-4AFE-9BE7-E02439D3694A}" type="slidenum">
               <a:rPr lang="en-US" sz="1200" smtClean="0">
@@ -4984,14 +4916,7 @@
                 <a:latin typeface="Comic Sans MS"/>
                 <a:cs typeface="Comic Sans MS"/>
               </a:rPr>
-              <a:t> </a:t>
-            </a:r>
-            <a:r>
-              <a:rPr lang="en-US" sz="1200" dirty="0" smtClean="0">
-                <a:latin typeface="Comic Sans MS"/>
-                <a:cs typeface="Comic Sans MS"/>
-              </a:rPr>
-              <a:t>12F.</a:t>
+              <a:t> 12F.</a:t>
             </a:r>
             <a:fld id="{93DA0692-DAF7-4AFE-9BE7-E02439D3694A}" type="slidenum">
               <a:rPr lang="en-US" sz="1200" smtClean="0">
@@ -5394,14 +5319,7 @@
                 <a:latin typeface="Comic Sans MS"/>
                 <a:cs typeface="Comic Sans MS"/>
               </a:rPr>
-              <a:t> </a:t>
-            </a:r>
-            <a:r>
-              <a:rPr lang="en-US" sz="1200" dirty="0" smtClean="0">
-                <a:latin typeface="Comic Sans MS"/>
-                <a:cs typeface="Comic Sans MS"/>
-              </a:rPr>
-              <a:t>12F.</a:t>
+              <a:t> 12F.</a:t>
             </a:r>
             <a:fld id="{93DA0692-DAF7-4AFE-9BE7-E02439D3694A}" type="slidenum">
               <a:rPr lang="en-US" sz="1200" smtClean="0">
@@ -5911,17 +5829,14 @@
                 <a:latin typeface="Comic Sans MS" pitchFamily="66" charset="0"/>
                 <a:sym typeface="Symbol" pitchFamily="18" charset="2"/>
               </a:rPr>
-              <a:t>Pr{</a:t>
-            </a:r>
-            <a:r>
-              <a:rPr lang="en-US" sz="6600" i="0" dirty="0" err="1" smtClean="0">
-                <a:solidFill>
-                  <a:srgbClr val="0000FF"/>
-                </a:solidFill>
+              <a:t>Pr</a:t>
+            </a:r>
+            <a:r>
+              <a:rPr lang="en-US" sz="6600" i="0" dirty="0" smtClean="0">
                 <a:latin typeface="Comic Sans MS" pitchFamily="66" charset="0"/>
                 <a:sym typeface="Symbol" pitchFamily="18" charset="2"/>
               </a:rPr>
-              <a:t>R</a:t>
+              <a:t>[</a:t>
             </a:r>
             <a:r>
               <a:rPr lang="en-US" sz="6600" i="0" dirty="0" smtClean="0">
@@ -5931,14 +5846,34 @@
                 <a:latin typeface="Comic Sans MS" pitchFamily="66" charset="0"/>
                 <a:sym typeface="Symbol" pitchFamily="18" charset="2"/>
               </a:rPr>
-              <a:t> = v</a:t>
-            </a:r>
-            <a:r>
-              <a:rPr lang="en-US" sz="6600" i="0" dirty="0">
+              <a:t>R </a:t>
+            </a:r>
+            <a:r>
+              <a:rPr lang="en-US" sz="6600" i="0" dirty="0" smtClean="0">
+                <a:solidFill>
+                  <a:srgbClr val="0000FF"/>
+                </a:solidFill>
                 <a:latin typeface="Comic Sans MS" pitchFamily="66" charset="0"/>
                 <a:sym typeface="Symbol" pitchFamily="18" charset="2"/>
               </a:rPr>
-              <a:t>}</a:t>
+              <a:t>= </a:t>
+            </a:r>
+            <a:r>
+              <a:rPr lang="en-US" sz="6600" i="0" dirty="0" smtClean="0">
+                <a:solidFill>
+                  <a:srgbClr val="0000FF"/>
+                </a:solidFill>
+                <a:latin typeface="Comic Sans MS" pitchFamily="66" charset="0"/>
+                <a:sym typeface="Symbol" pitchFamily="18" charset="2"/>
+              </a:rPr>
+              <a:t>v</a:t>
+            </a:r>
+            <a:r>
+              <a:rPr lang="en-US" sz="6600" i="0" dirty="0" smtClean="0">
+                <a:latin typeface="Comic Sans MS" pitchFamily="66" charset="0"/>
+                <a:sym typeface="Symbol" pitchFamily="18" charset="2"/>
+              </a:rPr>
+              <a:t>]</a:t>
             </a:r>
             <a:endParaRPr lang="en-US" sz="5400" i="0" dirty="0">
               <a:latin typeface="Comic Sans MS" pitchFamily="66" charset="0"/>
@@ -6028,7 +5963,7 @@
           <a:graphicData uri="http://schemas.openxmlformats.org/presentationml/2006/ole">
             <mc:AlternateContent xmlns:mc="http://schemas.openxmlformats.org/markup-compatibility/2006">
               <mc:Choice xmlns:v="urn:schemas-microsoft-com:vml" Requires="v">
-                <p:oleObj spid="_x0000_s182305" name="Equation" r:id="rId4" imgW="419040" imgH="419040" progId="Equation.DSMT4">
+                <p:oleObj spid="_x0000_s182307" name="Equation" r:id="rId4" imgW="419040" imgH="419040" progId="Equation.DSMT4">
                   <p:embed/>
                 </p:oleObj>
               </mc:Choice>
@@ -6215,14 +6150,7 @@
                 <a:latin typeface="Comic Sans MS"/>
                 <a:cs typeface="Comic Sans MS"/>
               </a:rPr>
-              <a:t> </a:t>
-            </a:r>
-            <a:r>
-              <a:rPr lang="en-US" sz="1200" dirty="0" smtClean="0">
-                <a:latin typeface="Comic Sans MS"/>
-                <a:cs typeface="Comic Sans MS"/>
-              </a:rPr>
-              <a:t>12F.</a:t>
+              <a:t> 12F.</a:t>
             </a:r>
             <a:fld id="{93DA0692-DAF7-4AFE-9BE7-E02439D3694A}" type="slidenum">
               <a:rPr lang="en-US" sz="1200" smtClean="0">
@@ -6567,22 +6495,28 @@
           <p:cNvGraphicFramePr>
             <a:graphicFrameLocks noChangeAspect="1"/>
           </p:cNvGraphicFramePr>
-          <p:nvPr/>
+          <p:nvPr>
+            <p:extLst>
+              <p:ext uri="{D42A27DB-BD31-4B8C-83A1-F6EECF244321}">
+                <p14:modId xmlns:p14="http://schemas.microsoft.com/office/powerpoint/2010/main" val="200653443"/>
+              </p:ext>
+            </p:extLst>
+          </p:nvPr>
         </p:nvGraphicFramePr>
         <p:xfrm>
-          <a:off x="854075" y="2281238"/>
-          <a:ext cx="7437438" cy="2143125"/>
+          <a:off x="884238" y="2343150"/>
+          <a:ext cx="7375525" cy="2017713"/>
         </p:xfrm>
         <a:graphic>
           <a:graphicData uri="http://schemas.openxmlformats.org/presentationml/2006/ole">
             <mc:AlternateContent xmlns:mc="http://schemas.openxmlformats.org/markup-compatibility/2006">
               <mc:Choice xmlns:v="urn:schemas-microsoft-com:vml" Requires="v">
-                <p:oleObj spid="_x0000_s184353" name="Equation" r:id="rId4" imgW="1498600" imgH="431800" progId="Equation.DSMT4">
+                <p:oleObj spid="_x0000_s184355" name="Equation" r:id="rId4" imgW="1485900" imgH="406400" progId="Equation.DSMT4">
                   <p:embed/>
                 </p:oleObj>
               </mc:Choice>
               <mc:Fallback>
-                <p:oleObj name="Equation" r:id="rId4" imgW="1498600" imgH="431800" progId="Equation.DSMT4">
+                <p:oleObj name="Equation" r:id="rId4" imgW="1485900" imgH="406400" progId="Equation.DSMT4">
                   <p:embed/>
                   <p:pic>
                     <p:nvPicPr>
@@ -6593,13 +6527,7 @@
                       <p:nvPr/>
                     </p:nvPicPr>
                     <p:blipFill>
-                      <a:blip r:embed="rId5">
-                        <a:extLst>
-                          <a:ext uri="{28A0092B-C50C-407E-A947-70E740481C1C}">
-                            <a14:useLocalDpi xmlns:a14="http://schemas.microsoft.com/office/drawing/2010/main" val="0"/>
-                          </a:ext>
-                        </a:extLst>
-                      </a:blip>
+                      <a:blip r:embed="rId5"/>
                       <a:srcRect/>
                       <a:stretch>
                         <a:fillRect/>
@@ -6607,8 +6535,8 @@
                     </p:blipFill>
                     <p:spPr bwMode="auto">
                       <a:xfrm>
-                        <a:off x="854075" y="2281238"/>
-                        <a:ext cx="7437438" cy="2143125"/>
+                        <a:off x="884238" y="2343150"/>
+                        <a:ext cx="7375525" cy="2017713"/>
                       </a:xfrm>
                       <a:prstGeom prst="rect">
                         <a:avLst/>
@@ -6810,14 +6738,7 @@
                 <a:latin typeface="Comic Sans MS"/>
                 <a:cs typeface="Comic Sans MS"/>
               </a:rPr>
-              <a:t> </a:t>
-            </a:r>
-            <a:r>
-              <a:rPr lang="en-US" sz="1200" dirty="0" smtClean="0">
-                <a:latin typeface="Comic Sans MS"/>
-                <a:cs typeface="Comic Sans MS"/>
-              </a:rPr>
-              <a:t>12F.</a:t>
+              <a:t> 12F.</a:t>
             </a:r>
             <a:fld id="{93DA0692-DAF7-4AFE-9BE7-E02439D3694A}" type="slidenum">
               <a:rPr lang="en-US" sz="1200" smtClean="0">
@@ -7025,25 +6946,25 @@
           <p:nvPr>
             <p:extLst>
               <p:ext uri="{D42A27DB-BD31-4B8C-83A1-F6EECF244321}">
-                <p14:modId xmlns:p14="http://schemas.microsoft.com/office/powerpoint/2010/main" val="1736035557"/>
+                <p14:modId xmlns:p14="http://schemas.microsoft.com/office/powerpoint/2010/main" val="2806667415"/>
               </p:ext>
             </p:extLst>
           </p:nvPr>
         </p:nvGraphicFramePr>
         <p:xfrm>
-          <a:off x="413429" y="2358761"/>
-          <a:ext cx="8295626" cy="2160189"/>
+          <a:off x="514350" y="2359025"/>
+          <a:ext cx="8093075" cy="2160588"/>
         </p:xfrm>
         <a:graphic>
           <a:graphicData uri="http://schemas.openxmlformats.org/presentationml/2006/ole">
             <mc:AlternateContent xmlns:mc="http://schemas.openxmlformats.org/markup-compatibility/2006">
               <mc:Choice xmlns:v="urn:schemas-microsoft-com:vml" Requires="v">
-                <p:oleObj spid="_x0000_s186400" name="Equation" r:id="rId4" imgW="1562100" imgH="406400" progId="Equation.DSMT4">
+                <p:oleObj spid="_x0000_s186402" name="Equation" r:id="rId4" imgW="1524000" imgH="406400" progId="Equation.DSMT4">
                   <p:embed/>
                 </p:oleObj>
               </mc:Choice>
               <mc:Fallback>
-                <p:oleObj name="Equation" r:id="rId4" imgW="1562100" imgH="406400" progId="Equation.DSMT4">
+                <p:oleObj name="Equation" r:id="rId4" imgW="1524000" imgH="406400" progId="Equation.DSMT4">
                   <p:embed/>
                   <p:pic>
                     <p:nvPicPr>
@@ -7062,8 +6983,8 @@
                     </p:blipFill>
                     <p:spPr bwMode="auto">
                       <a:xfrm>
-                        <a:off x="413429" y="2358761"/>
-                        <a:ext cx="8295626" cy="2160189"/>
+                        <a:off x="514350" y="2359025"/>
+                        <a:ext cx="8093075" cy="2160588"/>
                       </a:xfrm>
                       <a:prstGeom prst="rect">
                         <a:avLst/>
@@ -7148,14 +7069,7 @@
                 <a:latin typeface="Comic Sans MS"/>
                 <a:cs typeface="Comic Sans MS"/>
               </a:rPr>
-              <a:t> </a:t>
-            </a:r>
-            <a:r>
-              <a:rPr lang="en-US" sz="1200" dirty="0" smtClean="0">
-                <a:latin typeface="Comic Sans MS"/>
-                <a:cs typeface="Comic Sans MS"/>
-              </a:rPr>
-              <a:t>12F.</a:t>
+              <a:t> 12F.</a:t>
             </a:r>
             <a:fld id="{93DA0692-DAF7-4AFE-9BE7-E02439D3694A}" type="slidenum">
               <a:rPr lang="en-US" sz="1200" smtClean="0">
@@ -7252,25 +7166,25 @@
           <p:nvPr>
             <p:extLst>
               <p:ext uri="{D42A27DB-BD31-4B8C-83A1-F6EECF244321}">
-                <p14:modId xmlns:p14="http://schemas.microsoft.com/office/powerpoint/2010/main" val="3874285337"/>
+                <p14:modId xmlns:p14="http://schemas.microsoft.com/office/powerpoint/2010/main" val="2480819770"/>
               </p:ext>
             </p:extLst>
           </p:nvPr>
         </p:nvGraphicFramePr>
         <p:xfrm>
-          <a:off x="340179" y="1275673"/>
-          <a:ext cx="7403854" cy="1646136"/>
+          <a:off x="365125" y="1276350"/>
+          <a:ext cx="7351713" cy="1646238"/>
         </p:xfrm>
         <a:graphic>
           <a:graphicData uri="http://schemas.openxmlformats.org/presentationml/2006/ole">
             <mc:AlternateContent xmlns:mc="http://schemas.openxmlformats.org/markup-compatibility/2006">
               <mc:Choice xmlns:v="urn:schemas-microsoft-com:vml" Requires="v">
-                <p:oleObj spid="_x0000_s188512" name="Equation" r:id="rId4" imgW="1828800" imgH="406400" progId="Equation.DSMT4">
+                <p:oleObj spid="_x0000_s188516" name="Equation" r:id="rId4" imgW="1816100" imgH="406400" progId="Equation.DSMT4">
                   <p:embed/>
                 </p:oleObj>
               </mc:Choice>
               <mc:Fallback>
-                <p:oleObj name="Equation" r:id="rId4" imgW="1828800" imgH="406400" progId="Equation.DSMT4">
+                <p:oleObj name="Equation" r:id="rId4" imgW="1816100" imgH="406400" progId="Equation.DSMT4">
                   <p:embed/>
                   <p:pic>
                     <p:nvPicPr>
@@ -7289,8 +7203,8 @@
                     </p:blipFill>
                     <p:spPr bwMode="auto">
                       <a:xfrm>
-                        <a:off x="340179" y="1275673"/>
-                        <a:ext cx="7403854" cy="1646136"/>
+                        <a:off x="365125" y="1276350"/>
+                        <a:ext cx="7351713" cy="1646238"/>
                       </a:xfrm>
                       <a:prstGeom prst="rect">
                         <a:avLst/>
@@ -7314,25 +7228,25 @@
           <p:nvPr>
             <p:extLst>
               <p:ext uri="{D42A27DB-BD31-4B8C-83A1-F6EECF244321}">
-                <p14:modId xmlns:p14="http://schemas.microsoft.com/office/powerpoint/2010/main" val="434406757"/>
+                <p14:modId xmlns:p14="http://schemas.microsoft.com/office/powerpoint/2010/main" val="3123996535"/>
               </p:ext>
             </p:extLst>
           </p:nvPr>
         </p:nvGraphicFramePr>
         <p:xfrm>
-          <a:off x="2857940" y="2316860"/>
-          <a:ext cx="4999038" cy="1874838"/>
+          <a:off x="2879725" y="2316163"/>
+          <a:ext cx="4954588" cy="1874837"/>
         </p:xfrm>
         <a:graphic>
           <a:graphicData uri="http://schemas.openxmlformats.org/presentationml/2006/ole">
             <mc:AlternateContent xmlns:mc="http://schemas.openxmlformats.org/markup-compatibility/2006">
               <mc:Choice xmlns:v="urn:schemas-microsoft-com:vml" Requires="v">
-                <p:oleObj spid="_x0000_s188513" name="Equation" r:id="rId6" imgW="1422400" imgH="533400" progId="Equation.DSMT4">
+                <p:oleObj spid="_x0000_s188517" name="Equation" r:id="rId6" imgW="1409700" imgH="533400" progId="Equation.DSMT4">
                   <p:embed/>
                 </p:oleObj>
               </mc:Choice>
               <mc:Fallback>
-                <p:oleObj name="Equation" r:id="rId6" imgW="1422400" imgH="533400" progId="Equation.DSMT4">
+                <p:oleObj name="Equation" r:id="rId6" imgW="1409700" imgH="533400" progId="Equation.DSMT4">
                   <p:embed/>
                   <p:pic>
                     <p:nvPicPr>
@@ -7351,8 +7265,8 @@
                     </p:blipFill>
                     <p:spPr bwMode="auto">
                       <a:xfrm>
-                        <a:off x="2857940" y="2316860"/>
-                        <a:ext cx="4999038" cy="1874838"/>
+                        <a:off x="2879725" y="2316163"/>
+                        <a:ext cx="4954588" cy="1874837"/>
                       </a:xfrm>
                       <a:prstGeom prst="rect">
                         <a:avLst/>
@@ -7384,25 +7298,25 @@
           <p:nvPr>
             <p:extLst>
               <p:ext uri="{D42A27DB-BD31-4B8C-83A1-F6EECF244321}">
-                <p14:modId xmlns:p14="http://schemas.microsoft.com/office/powerpoint/2010/main" val="2751739976"/>
+                <p14:modId xmlns:p14="http://schemas.microsoft.com/office/powerpoint/2010/main" val="1309777056"/>
               </p:ext>
             </p:extLst>
           </p:nvPr>
         </p:nvGraphicFramePr>
         <p:xfrm>
-          <a:off x="2891728" y="3902085"/>
-          <a:ext cx="4464050" cy="1428750"/>
+          <a:off x="2936875" y="3902075"/>
+          <a:ext cx="4373563" cy="1428750"/>
         </p:xfrm>
         <a:graphic>
           <a:graphicData uri="http://schemas.openxmlformats.org/presentationml/2006/ole">
             <mc:AlternateContent xmlns:mc="http://schemas.openxmlformats.org/markup-compatibility/2006">
               <mc:Choice xmlns:v="urn:schemas-microsoft-com:vml" Requires="v">
-                <p:oleObj spid="_x0000_s188514" name="Equation" r:id="rId8" imgW="1270000" imgH="406400" progId="Equation.DSMT4">
+                <p:oleObj spid="_x0000_s188518" name="Equation" r:id="rId8" imgW="1244600" imgH="406400" progId="Equation.DSMT4">
                   <p:embed/>
                 </p:oleObj>
               </mc:Choice>
               <mc:Fallback>
-                <p:oleObj name="Equation" r:id="rId8" imgW="1270000" imgH="406400" progId="Equation.DSMT4">
+                <p:oleObj name="Equation" r:id="rId8" imgW="1244600" imgH="406400" progId="Equation.DSMT4">
                   <p:embed/>
                   <p:pic>
                     <p:nvPicPr>
@@ -7421,8 +7335,8 @@
                     </p:blipFill>
                     <p:spPr bwMode="auto">
                       <a:xfrm>
-                        <a:off x="2891728" y="3902085"/>
-                        <a:ext cx="4464050" cy="1428750"/>
+                        <a:off x="2936875" y="3902075"/>
+                        <a:ext cx="4373563" cy="1428750"/>
                       </a:xfrm>
                       <a:prstGeom prst="rect">
                         <a:avLst/>
@@ -7515,14 +7429,7 @@
                 <a:latin typeface="Comic Sans MS"/>
                 <a:cs typeface="Comic Sans MS"/>
               </a:rPr>
-              <a:t> </a:t>
-            </a:r>
-            <a:r>
-              <a:rPr lang="en-US" sz="1200" dirty="0" smtClean="0">
-                <a:latin typeface="Comic Sans MS"/>
-                <a:cs typeface="Comic Sans MS"/>
-              </a:rPr>
-              <a:t>12F.</a:t>
+              <a:t> 12F.</a:t>
             </a:r>
             <a:fld id="{93DA0692-DAF7-4AFE-9BE7-E02439D3694A}" type="slidenum">
               <a:rPr lang="en-US" sz="1200" smtClean="0">
@@ -7748,25 +7655,25 @@
           <p:nvPr>
             <p:extLst>
               <p:ext uri="{D42A27DB-BD31-4B8C-83A1-F6EECF244321}">
-                <p14:modId xmlns:p14="http://schemas.microsoft.com/office/powerpoint/2010/main" val="3568862582"/>
+                <p14:modId xmlns:p14="http://schemas.microsoft.com/office/powerpoint/2010/main" val="1902005388"/>
               </p:ext>
             </p:extLst>
           </p:nvPr>
         </p:nvGraphicFramePr>
         <p:xfrm>
-          <a:off x="340179" y="1275673"/>
-          <a:ext cx="7403854" cy="1646136"/>
+          <a:off x="365125" y="1276350"/>
+          <a:ext cx="7351713" cy="1646238"/>
         </p:xfrm>
         <a:graphic>
           <a:graphicData uri="http://schemas.openxmlformats.org/presentationml/2006/ole">
             <mc:AlternateContent xmlns:mc="http://schemas.openxmlformats.org/markup-compatibility/2006">
               <mc:Choice xmlns:v="urn:schemas-microsoft-com:vml" Requires="v">
-                <p:oleObj spid="_x0000_s571422" name="Equation" r:id="rId4" imgW="1828800" imgH="406400" progId="Equation.DSMT4">
+                <p:oleObj spid="_x0000_s571427" name="Equation" r:id="rId4" imgW="1816100" imgH="406400" progId="Equation.DSMT4">
                   <p:embed/>
                 </p:oleObj>
               </mc:Choice>
               <mc:Fallback>
-                <p:oleObj name="Equation" r:id="rId4" imgW="1828800" imgH="406400" progId="Equation.DSMT4">
+                <p:oleObj name="Equation" r:id="rId4" imgW="1816100" imgH="406400" progId="Equation.DSMT4">
                   <p:embed/>
                   <p:pic>
                     <p:nvPicPr>
@@ -7785,8 +7692,8 @@
                     </p:blipFill>
                     <p:spPr bwMode="auto">
                       <a:xfrm>
-                        <a:off x="340179" y="1275673"/>
-                        <a:ext cx="7403854" cy="1646136"/>
+                        <a:off x="365125" y="1276350"/>
+                        <a:ext cx="7351713" cy="1646238"/>
                       </a:xfrm>
                       <a:prstGeom prst="rect">
                         <a:avLst/>
@@ -7810,25 +7717,25 @@
           <p:nvPr>
             <p:extLst>
               <p:ext uri="{D42A27DB-BD31-4B8C-83A1-F6EECF244321}">
-                <p14:modId xmlns:p14="http://schemas.microsoft.com/office/powerpoint/2010/main" val="2577746831"/>
+                <p14:modId xmlns:p14="http://schemas.microsoft.com/office/powerpoint/2010/main" val="3612852367"/>
               </p:ext>
             </p:extLst>
           </p:nvPr>
         </p:nvGraphicFramePr>
         <p:xfrm>
-          <a:off x="2881560" y="5116513"/>
-          <a:ext cx="4451350" cy="1547812"/>
+          <a:off x="2928938" y="5116513"/>
+          <a:ext cx="4354512" cy="1547812"/>
         </p:xfrm>
         <a:graphic>
           <a:graphicData uri="http://schemas.openxmlformats.org/presentationml/2006/ole">
             <mc:AlternateContent xmlns:mc="http://schemas.openxmlformats.org/markup-compatibility/2006">
               <mc:Choice xmlns:v="urn:schemas-microsoft-com:vml" Requires="v">
-                <p:oleObj spid="_x0000_s571423" name="Equation" r:id="rId6" imgW="1168400" imgH="406400" progId="Equation.DSMT4">
+                <p:oleObj spid="_x0000_s571428" name="Equation" r:id="rId6" imgW="1143000" imgH="406400" progId="Equation.DSMT4">
                   <p:embed/>
                 </p:oleObj>
               </mc:Choice>
               <mc:Fallback>
-                <p:oleObj name="Equation" r:id="rId6" imgW="1168400" imgH="406400" progId="Equation.DSMT4">
+                <p:oleObj name="Equation" r:id="rId6" imgW="1143000" imgH="406400" progId="Equation.DSMT4">
                   <p:embed/>
                   <p:pic>
                     <p:nvPicPr>
@@ -7847,8 +7754,8 @@
                     </p:blipFill>
                     <p:spPr bwMode="auto">
                       <a:xfrm>
-                        <a:off x="2881560" y="5116513"/>
-                        <a:ext cx="4451350" cy="1547812"/>
+                        <a:off x="2928938" y="5116513"/>
+                        <a:ext cx="4354512" cy="1547812"/>
                       </a:xfrm>
                       <a:prstGeom prst="rect">
                         <a:avLst/>
@@ -7880,25 +7787,25 @@
           <p:nvPr>
             <p:extLst>
               <p:ext uri="{D42A27DB-BD31-4B8C-83A1-F6EECF244321}">
-                <p14:modId xmlns:p14="http://schemas.microsoft.com/office/powerpoint/2010/main" val="3159746565"/>
+                <p14:modId xmlns:p14="http://schemas.microsoft.com/office/powerpoint/2010/main" val="3313452382"/>
               </p:ext>
             </p:extLst>
           </p:nvPr>
         </p:nvGraphicFramePr>
         <p:xfrm>
-          <a:off x="2857940" y="2316860"/>
-          <a:ext cx="4999038" cy="1874838"/>
+          <a:off x="2879725" y="2316163"/>
+          <a:ext cx="4954588" cy="1874837"/>
         </p:xfrm>
         <a:graphic>
           <a:graphicData uri="http://schemas.openxmlformats.org/presentationml/2006/ole">
             <mc:AlternateContent xmlns:mc="http://schemas.openxmlformats.org/markup-compatibility/2006">
               <mc:Choice xmlns:v="urn:schemas-microsoft-com:vml" Requires="v">
-                <p:oleObj spid="_x0000_s571424" name="Equation" r:id="rId8" imgW="1422400" imgH="533400" progId="Equation.DSMT4">
+                <p:oleObj spid="_x0000_s571429" name="Equation" r:id="rId8" imgW="1409700" imgH="533400" progId="Equation.DSMT4">
                   <p:embed/>
                 </p:oleObj>
               </mc:Choice>
               <mc:Fallback>
-                <p:oleObj name="Equation" r:id="rId8" imgW="1422400" imgH="533400" progId="Equation.DSMT4">
+                <p:oleObj name="Equation" r:id="rId8" imgW="1409700" imgH="533400" progId="Equation.DSMT4">
                   <p:embed/>
                   <p:pic>
                     <p:nvPicPr>
@@ -7917,8 +7824,8 @@
                     </p:blipFill>
                     <p:spPr bwMode="auto">
                       <a:xfrm>
-                        <a:off x="2857940" y="2316860"/>
-                        <a:ext cx="4999038" cy="1874838"/>
+                        <a:off x="2879725" y="2316163"/>
+                        <a:ext cx="4954588" cy="1874837"/>
                       </a:xfrm>
                       <a:prstGeom prst="rect">
                         <a:avLst/>
@@ -8011,14 +7918,7 @@
                 <a:latin typeface="Comic Sans MS"/>
                 <a:cs typeface="Comic Sans MS"/>
               </a:rPr>
-              <a:t> </a:t>
-            </a:r>
-            <a:r>
-              <a:rPr lang="en-US" sz="1200" dirty="0" smtClean="0">
-                <a:latin typeface="Comic Sans MS"/>
-                <a:cs typeface="Comic Sans MS"/>
-              </a:rPr>
-              <a:t>12F.</a:t>
+              <a:t> 12F.</a:t>
             </a:r>
             <a:fld id="{93DA0692-DAF7-4AFE-9BE7-E02439D3694A}" type="slidenum">
               <a:rPr lang="en-US" sz="1200" smtClean="0">
@@ -8046,25 +7946,25 @@
           <p:nvPr>
             <p:extLst>
               <p:ext uri="{D42A27DB-BD31-4B8C-83A1-F6EECF244321}">
-                <p14:modId xmlns:p14="http://schemas.microsoft.com/office/powerpoint/2010/main" val="2826804848"/>
+                <p14:modId xmlns:p14="http://schemas.microsoft.com/office/powerpoint/2010/main" val="931292016"/>
               </p:ext>
             </p:extLst>
           </p:nvPr>
         </p:nvGraphicFramePr>
         <p:xfrm>
-          <a:off x="2875893" y="3902075"/>
-          <a:ext cx="5311775" cy="1428750"/>
+          <a:off x="2921000" y="3902075"/>
+          <a:ext cx="5221288" cy="1428750"/>
         </p:xfrm>
         <a:graphic>
           <a:graphicData uri="http://schemas.openxmlformats.org/presentationml/2006/ole">
             <mc:AlternateContent xmlns:mc="http://schemas.openxmlformats.org/markup-compatibility/2006">
               <mc:Choice xmlns:v="urn:schemas-microsoft-com:vml" Requires="v">
-                <p:oleObj spid="_x0000_s571425" name="Equation" r:id="rId10" imgW="1511300" imgH="406400" progId="Equation.DSMT4">
+                <p:oleObj spid="_x0000_s571430" name="Equation" r:id="rId10" imgW="1485900" imgH="406400" progId="Equation.DSMT4">
                   <p:embed/>
                 </p:oleObj>
               </mc:Choice>
               <mc:Fallback>
-                <p:oleObj name="Equation" r:id="rId10" imgW="1511300" imgH="406400" progId="Equation.DSMT4">
+                <p:oleObj name="Equation" r:id="rId10" imgW="1485900" imgH="406400" progId="Equation.DSMT4">
                   <p:embed/>
                   <p:pic>
                     <p:nvPicPr>
@@ -8083,8 +7983,8 @@
                     </p:blipFill>
                     <p:spPr bwMode="auto">
                       <a:xfrm>
-                        <a:off x="2875893" y="3902075"/>
-                        <a:ext cx="5311775" cy="1428750"/>
+                        <a:off x="2921000" y="3902075"/>
+                        <a:ext cx="5221288" cy="1428750"/>
                       </a:xfrm>
                       <a:prstGeom prst="rect">
                         <a:avLst/>
@@ -8361,7 +8261,7 @@
           <a:graphicData uri="http://schemas.openxmlformats.org/presentationml/2006/ole">
             <mc:AlternateContent xmlns:mc="http://schemas.openxmlformats.org/markup-compatibility/2006">
               <mc:Choice xmlns:v="urn:schemas-microsoft-com:vml" Requires="v">
-                <p:oleObj spid="_x0000_s190496" name="Equation" r:id="rId4" imgW="914400" imgH="220320" progId="Equation.DSMT4">
+                <p:oleObj spid="_x0000_s190498" name="Equation" r:id="rId4" imgW="914400" imgH="220320" progId="Equation.DSMT4">
                   <p:embed/>
                 </p:oleObj>
               </mc:Choice>
@@ -8638,14 +8538,7 @@
                 <a:latin typeface="Comic Sans MS"/>
                 <a:cs typeface="Comic Sans MS"/>
               </a:rPr>
-              <a:t> </a:t>
-            </a:r>
-            <a:r>
-              <a:rPr lang="en-US" sz="1200" dirty="0" smtClean="0">
-                <a:latin typeface="Comic Sans MS"/>
-                <a:cs typeface="Comic Sans MS"/>
-              </a:rPr>
-              <a:t>12F.</a:t>
+              <a:t> 12F.</a:t>
             </a:r>
             <a:fld id="{93DA0692-DAF7-4AFE-9BE7-E02439D3694A}" type="slidenum">
               <a:rPr lang="en-US" sz="1200" smtClean="0">
@@ -8844,14 +8737,7 @@
                 <a:latin typeface="Comic Sans MS"/>
                 <a:cs typeface="Comic Sans MS"/>
               </a:rPr>
-              <a:t> </a:t>
-            </a:r>
-            <a:r>
-              <a:rPr lang="en-US" sz="1200" dirty="0" smtClean="0">
-                <a:latin typeface="Comic Sans MS"/>
-                <a:cs typeface="Comic Sans MS"/>
-              </a:rPr>
-              <a:t>12F.</a:t>
+              <a:t> 12F.</a:t>
             </a:r>
             <a:fld id="{93DA0692-DAF7-4AFE-9BE7-E02439D3694A}" type="slidenum">
               <a:rPr lang="en-US" sz="1200" smtClean="0">
@@ -8997,11 +8883,7 @@
             </a:r>
             <a:r>
               <a:rPr lang="en-US" dirty="0" smtClean="0"/>
-              <a:t> </a:t>
-            </a:r>
-            <a:r>
-              <a:rPr lang="en-US" dirty="0" smtClean="0"/>
-              <a:t>12F.</a:t>
+              <a:t> 12F.</a:t>
             </a:r>
             <a:fld id="{93DA0692-DAF7-4AFE-9BE7-E02439D3694A}" type="slidenum">
               <a:rPr lang="en-US" smtClean="0"/>
@@ -9198,14 +9080,7 @@
                 <a:latin typeface="Comic Sans MS"/>
                 <a:cs typeface="Comic Sans MS"/>
               </a:rPr>
-              <a:t> </a:t>
-            </a:r>
-            <a:r>
-              <a:rPr lang="en-US" sz="1200" dirty="0" smtClean="0">
-                <a:latin typeface="Comic Sans MS"/>
-                <a:cs typeface="Comic Sans MS"/>
-              </a:rPr>
-              <a:t>12F.</a:t>
+              <a:t> 12F.</a:t>
             </a:r>
             <a:fld id="{93DA0692-DAF7-4AFE-9BE7-E02439D3694A}" type="slidenum">
               <a:rPr lang="en-US" sz="1200" smtClean="0">
@@ -9816,14 +9691,7 @@
                 <a:latin typeface="Comic Sans MS"/>
                 <a:cs typeface="Comic Sans MS"/>
               </a:rPr>
-              <a:t> </a:t>
-            </a:r>
-            <a:r>
-              <a:rPr lang="en-US" sz="1200" dirty="0" smtClean="0">
-                <a:latin typeface="Comic Sans MS"/>
-                <a:cs typeface="Comic Sans MS"/>
-              </a:rPr>
-              <a:t>12F.</a:t>
+              <a:t> 12F.</a:t>
             </a:r>
             <a:fld id="{93DA0692-DAF7-4AFE-9BE7-E02439D3694A}" type="slidenum">
               <a:rPr lang="en-US" sz="1200" smtClean="0">
@@ -10194,14 +10062,7 @@
                 <a:latin typeface="Comic Sans MS"/>
                 <a:cs typeface="Comic Sans MS"/>
               </a:rPr>
-              <a:t> </a:t>
-            </a:r>
-            <a:r>
-              <a:rPr lang="en-US" sz="1200" dirty="0" smtClean="0">
-                <a:latin typeface="Comic Sans MS"/>
-                <a:cs typeface="Comic Sans MS"/>
-              </a:rPr>
-              <a:t>12F.</a:t>
+              <a:t> 12F.</a:t>
             </a:r>
             <a:fld id="{93DA0692-DAF7-4AFE-9BE7-E02439D3694A}" type="slidenum">
               <a:rPr lang="en-US" sz="1200" smtClean="0">
@@ -10321,22 +10182,28 @@
           <p:cNvGraphicFramePr>
             <a:graphicFrameLocks noChangeAspect="1"/>
           </p:cNvGraphicFramePr>
-          <p:nvPr/>
+          <p:nvPr>
+            <p:extLst>
+              <p:ext uri="{D42A27DB-BD31-4B8C-83A1-F6EECF244321}">
+                <p14:modId xmlns:p14="http://schemas.microsoft.com/office/powerpoint/2010/main" val="3294260181"/>
+              </p:ext>
+            </p:extLst>
+          </p:nvPr>
         </p:nvGraphicFramePr>
         <p:xfrm>
-          <a:off x="2590800" y="1066800"/>
-          <a:ext cx="3120958" cy="1466850"/>
+          <a:off x="2636838" y="1082675"/>
+          <a:ext cx="3027362" cy="1435100"/>
         </p:xfrm>
         <a:graphic>
           <a:graphicData uri="http://schemas.openxmlformats.org/presentationml/2006/ole">
             <mc:AlternateContent xmlns:mc="http://schemas.openxmlformats.org/markup-compatibility/2006">
               <mc:Choice xmlns:v="urn:schemas-microsoft-com:vml" Requires="v">
-                <p:oleObj spid="_x0000_s168030" name="Equation" r:id="rId4" imgW="1270000" imgH="596900" progId="Equation.DSMT4">
+                <p:oleObj spid="_x0000_s168035" name="Equation" r:id="rId4" imgW="1231900" imgH="584200" progId="Equation.DSMT4">
                   <p:embed/>
                 </p:oleObj>
               </mc:Choice>
               <mc:Fallback>
-                <p:oleObj name="Equation" r:id="rId4" imgW="1270000" imgH="596900" progId="Equation.DSMT4">
+                <p:oleObj name="Equation" r:id="rId4" imgW="1231900" imgH="584200" progId="Equation.DSMT4">
                   <p:embed/>
                   <p:pic>
                     <p:nvPicPr>
@@ -10347,13 +10214,7 @@
                       <p:nvPr/>
                     </p:nvPicPr>
                     <p:blipFill>
-                      <a:blip r:embed="rId5">
-                        <a:extLst>
-                          <a:ext uri="{28A0092B-C50C-407E-A947-70E740481C1C}">
-                            <a14:useLocalDpi xmlns:a14="http://schemas.microsoft.com/office/drawing/2010/main" val="0"/>
-                          </a:ext>
-                        </a:extLst>
-                      </a:blip>
+                      <a:blip r:embed="rId5"/>
                       <a:srcRect/>
                       <a:stretch>
                         <a:fillRect/>
@@ -10361,8 +10222,8 @@
                     </p:blipFill>
                     <p:spPr bwMode="auto">
                       <a:xfrm>
-                        <a:off x="2590800" y="1066800"/>
-                        <a:ext cx="3120958" cy="1466850"/>
+                        <a:off x="2636838" y="1082675"/>
+                        <a:ext cx="3027362" cy="1435100"/>
                       </a:xfrm>
                       <a:prstGeom prst="rect">
                         <a:avLst/>
@@ -10391,22 +10252,28 @@
           <p:cNvGraphicFramePr>
             <a:graphicFrameLocks noChangeAspect="1"/>
           </p:cNvGraphicFramePr>
-          <p:nvPr/>
+          <p:nvPr>
+            <p:extLst>
+              <p:ext uri="{D42A27DB-BD31-4B8C-83A1-F6EECF244321}">
+                <p14:modId xmlns:p14="http://schemas.microsoft.com/office/powerpoint/2010/main" val="2918959446"/>
+              </p:ext>
+            </p:extLst>
+          </p:nvPr>
         </p:nvGraphicFramePr>
         <p:xfrm>
-          <a:off x="2895599" y="2362200"/>
-          <a:ext cx="3908393" cy="1458478"/>
+          <a:off x="2941638" y="2376488"/>
+          <a:ext cx="3814762" cy="1428750"/>
         </p:xfrm>
         <a:graphic>
           <a:graphicData uri="http://schemas.openxmlformats.org/presentationml/2006/ole">
             <mc:AlternateContent xmlns:mc="http://schemas.openxmlformats.org/markup-compatibility/2006">
               <mc:Choice xmlns:v="urn:schemas-microsoft-com:vml" Requires="v">
-                <p:oleObj spid="_x0000_s168031" name="Equation" r:id="rId6" imgW="1600200" imgH="596900" progId="Equation.DSMT4">
+                <p:oleObj spid="_x0000_s168036" name="Equation" r:id="rId6" imgW="1562100" imgH="584200" progId="Equation.DSMT4">
                   <p:embed/>
                 </p:oleObj>
               </mc:Choice>
               <mc:Fallback>
-                <p:oleObj name="Equation" r:id="rId6" imgW="1600200" imgH="596900" progId="Equation.DSMT4">
+                <p:oleObj name="Equation" r:id="rId6" imgW="1562100" imgH="584200" progId="Equation.DSMT4">
                   <p:embed/>
                   <p:pic>
                     <p:nvPicPr>
@@ -10417,13 +10284,7 @@
                       <p:nvPr/>
                     </p:nvPicPr>
                     <p:blipFill>
-                      <a:blip r:embed="rId7">
-                        <a:extLst>
-                          <a:ext uri="{28A0092B-C50C-407E-A947-70E740481C1C}">
-                            <a14:useLocalDpi xmlns:a14="http://schemas.microsoft.com/office/drawing/2010/main" val="0"/>
-                          </a:ext>
-                        </a:extLst>
-                      </a:blip>
+                      <a:blip r:embed="rId7"/>
                       <a:srcRect/>
                       <a:stretch>
                         <a:fillRect/>
@@ -10431,8 +10292,8 @@
                     </p:blipFill>
                     <p:spPr bwMode="auto">
                       <a:xfrm>
-                        <a:off x="2895599" y="2362200"/>
-                        <a:ext cx="3908393" cy="1458478"/>
+                        <a:off x="2941638" y="2376488"/>
+                        <a:ext cx="3814762" cy="1428750"/>
                       </a:xfrm>
                       <a:prstGeom prst="rect">
                         <a:avLst/>
@@ -10461,22 +10322,28 @@
           <p:cNvGraphicFramePr>
             <a:graphicFrameLocks noChangeAspect="1"/>
           </p:cNvGraphicFramePr>
-          <p:nvPr/>
+          <p:nvPr>
+            <p:extLst>
+              <p:ext uri="{D42A27DB-BD31-4B8C-83A1-F6EECF244321}">
+                <p14:modId xmlns:p14="http://schemas.microsoft.com/office/powerpoint/2010/main" val="3862401882"/>
+              </p:ext>
+            </p:extLst>
+          </p:nvPr>
         </p:nvGraphicFramePr>
         <p:xfrm>
-          <a:off x="2728912" y="3657600"/>
-          <a:ext cx="4129088" cy="1427141"/>
+          <a:off x="2773363" y="3671888"/>
+          <a:ext cx="4038600" cy="1397000"/>
         </p:xfrm>
         <a:graphic>
           <a:graphicData uri="http://schemas.openxmlformats.org/presentationml/2006/ole">
             <mc:AlternateContent xmlns:mc="http://schemas.openxmlformats.org/markup-compatibility/2006">
               <mc:Choice xmlns:v="urn:schemas-microsoft-com:vml" Requires="v">
-                <p:oleObj spid="_x0000_s168032" name="Equation" r:id="rId8" imgW="1727200" imgH="596900" progId="Equation.DSMT4">
+                <p:oleObj spid="_x0000_s168037" name="Equation" r:id="rId8" imgW="1689100" imgH="584200" progId="Equation.DSMT4">
                   <p:embed/>
                 </p:oleObj>
               </mc:Choice>
               <mc:Fallback>
-                <p:oleObj name="Equation" r:id="rId8" imgW="1727200" imgH="596900" progId="Equation.DSMT4">
+                <p:oleObj name="Equation" r:id="rId8" imgW="1689100" imgH="584200" progId="Equation.DSMT4">
                   <p:embed/>
                   <p:pic>
                     <p:nvPicPr>
@@ -10487,13 +10354,7 @@
                       <p:nvPr/>
                     </p:nvPicPr>
                     <p:blipFill>
-                      <a:blip r:embed="rId9">
-                        <a:extLst>
-                          <a:ext uri="{28A0092B-C50C-407E-A947-70E740481C1C}">
-                            <a14:useLocalDpi xmlns:a14="http://schemas.microsoft.com/office/drawing/2010/main" val="0"/>
-                          </a:ext>
-                        </a:extLst>
-                      </a:blip>
+                      <a:blip r:embed="rId9"/>
                       <a:srcRect/>
                       <a:stretch>
                         <a:fillRect/>
@@ -10501,8 +10362,8 @@
                     </p:blipFill>
                     <p:spPr bwMode="auto">
                       <a:xfrm>
-                        <a:off x="2728912" y="3657600"/>
-                        <a:ext cx="4129088" cy="1427141"/>
+                        <a:off x="2773363" y="3671888"/>
+                        <a:ext cx="4038600" cy="1397000"/>
                       </a:xfrm>
                       <a:prstGeom prst="rect">
                         <a:avLst/>
@@ -10531,22 +10392,28 @@
           <p:cNvGraphicFramePr>
             <a:graphicFrameLocks noChangeAspect="1"/>
           </p:cNvGraphicFramePr>
-          <p:nvPr/>
+          <p:nvPr>
+            <p:extLst>
+              <p:ext uri="{D42A27DB-BD31-4B8C-83A1-F6EECF244321}">
+                <p14:modId xmlns:p14="http://schemas.microsoft.com/office/powerpoint/2010/main" val="2028771054"/>
+              </p:ext>
+            </p:extLst>
+          </p:nvPr>
         </p:nvGraphicFramePr>
         <p:xfrm>
-          <a:off x="2819400" y="4876800"/>
-          <a:ext cx="3005138" cy="1427162"/>
+          <a:off x="2863850" y="4891088"/>
+          <a:ext cx="2914650" cy="1397000"/>
         </p:xfrm>
         <a:graphic>
           <a:graphicData uri="http://schemas.openxmlformats.org/presentationml/2006/ole">
             <mc:AlternateContent xmlns:mc="http://schemas.openxmlformats.org/markup-compatibility/2006">
               <mc:Choice xmlns:v="urn:schemas-microsoft-com:vml" Requires="v">
-                <p:oleObj spid="_x0000_s168033" name="Equation" r:id="rId10" imgW="1257300" imgH="596900" progId="Equation.DSMT4">
+                <p:oleObj spid="_x0000_s168038" name="Equation" r:id="rId10" imgW="1219200" imgH="584200" progId="Equation.DSMT4">
                   <p:embed/>
                 </p:oleObj>
               </mc:Choice>
               <mc:Fallback>
-                <p:oleObj name="Equation" r:id="rId10" imgW="1257300" imgH="596900" progId="Equation.DSMT4">
+                <p:oleObj name="Equation" r:id="rId10" imgW="1219200" imgH="584200" progId="Equation.DSMT4">
                   <p:embed/>
                   <p:pic>
                     <p:nvPicPr>
@@ -10557,13 +10424,7 @@
                       <p:nvPr/>
                     </p:nvPicPr>
                     <p:blipFill>
-                      <a:blip r:embed="rId11">
-                        <a:extLst>
-                          <a:ext uri="{28A0092B-C50C-407E-A947-70E740481C1C}">
-                            <a14:useLocalDpi xmlns:a14="http://schemas.microsoft.com/office/drawing/2010/main" val="0"/>
-                          </a:ext>
-                        </a:extLst>
-                      </a:blip>
+                      <a:blip r:embed="rId11"/>
                       <a:srcRect/>
                       <a:stretch>
                         <a:fillRect/>
@@ -10571,8 +10432,8 @@
                     </p:blipFill>
                     <p:spPr bwMode="auto">
                       <a:xfrm>
-                        <a:off x="2819400" y="4876800"/>
-                        <a:ext cx="3005138" cy="1427162"/>
+                        <a:off x="2863850" y="4891088"/>
+                        <a:ext cx="2914650" cy="1397000"/>
                       </a:xfrm>
                       <a:prstGeom prst="rect">
                         <a:avLst/>
@@ -10633,14 +10494,7 @@
                 <a:latin typeface="Comic Sans MS"/>
                 <a:cs typeface="Comic Sans MS"/>
               </a:rPr>
-              <a:t> </a:t>
-            </a:r>
-            <a:r>
-              <a:rPr lang="en-US" sz="1200" dirty="0" smtClean="0">
-                <a:latin typeface="Comic Sans MS"/>
-                <a:cs typeface="Comic Sans MS"/>
-              </a:rPr>
-              <a:t>12F.</a:t>
+              <a:t> 12F.</a:t>
             </a:r>
             <a:fld id="{93DA0692-DAF7-4AFE-9BE7-E02439D3694A}" type="slidenum">
               <a:rPr lang="en-US" sz="1200" smtClean="0">
@@ -11607,14 +11461,7 @@
                 <a:latin typeface="Comic Sans MS"/>
                 <a:cs typeface="Comic Sans MS"/>
               </a:rPr>
-              <a:t> </a:t>
-            </a:r>
-            <a:r>
-              <a:rPr lang="en-US" sz="1200" dirty="0" smtClean="0">
-                <a:latin typeface="Comic Sans MS"/>
-                <a:cs typeface="Comic Sans MS"/>
-              </a:rPr>
-              <a:t>12F.</a:t>
+              <a:t> 12F.</a:t>
             </a:r>
             <a:fld id="{93DA0692-DAF7-4AFE-9BE7-E02439D3694A}" type="slidenum">
               <a:rPr lang="en-US" sz="1200" smtClean="0">
@@ -12019,14 +11866,7 @@
                 <a:latin typeface="Comic Sans MS"/>
                 <a:cs typeface="Comic Sans MS"/>
               </a:rPr>
-              <a:t> </a:t>
-            </a:r>
-            <a:r>
-              <a:rPr lang="en-US" sz="1200" dirty="0" smtClean="0">
-                <a:latin typeface="Comic Sans MS"/>
-                <a:cs typeface="Comic Sans MS"/>
-              </a:rPr>
-              <a:t>12F.</a:t>
+              <a:t> 12F.</a:t>
             </a:r>
             <a:fld id="{93DA0692-DAF7-4AFE-9BE7-E02439D3694A}" type="slidenum">
               <a:rPr lang="en-US" sz="1200" smtClean="0">
@@ -12375,7 +12215,7 @@
           <a:graphicData uri="http://schemas.openxmlformats.org/presentationml/2006/ole">
             <mc:AlternateContent xmlns:mc="http://schemas.openxmlformats.org/markup-compatibility/2006">
               <mc:Choice xmlns:v="urn:schemas-microsoft-com:vml" Requires="v">
-                <p:oleObj spid="_x0000_s174111" name="Equation" r:id="rId4" imgW="2006280" imgH="812520" progId="Equation.DSMT4">
+                <p:oleObj spid="_x0000_s174113" name="Equation" r:id="rId4" imgW="2006280" imgH="812520" progId="Equation.DSMT4">
                   <p:embed/>
                 </p:oleObj>
               </mc:Choice>
@@ -12598,14 +12438,7 @@
                 <a:latin typeface="Comic Sans MS"/>
                 <a:cs typeface="Comic Sans MS"/>
               </a:rPr>
-              <a:t> </a:t>
-            </a:r>
-            <a:r>
-              <a:rPr lang="en-US" sz="1200" dirty="0" smtClean="0">
-                <a:latin typeface="Comic Sans MS"/>
-                <a:cs typeface="Comic Sans MS"/>
-              </a:rPr>
-              <a:t>12F.</a:t>
+              <a:t> 12F.</a:t>
             </a:r>
             <a:fld id="{93DA0692-DAF7-4AFE-9BE7-E02439D3694A}" type="slidenum">
               <a:rPr lang="en-US" sz="1200" smtClean="0">

</xml_diff>